<commit_message>
Add dynamically generated recommendations from LLM
</commit_message>
<xml_diff>
--- a/Master_QBR_Template.pptx
+++ b/Master_QBR_Template.pptx
@@ -4297,8 +4297,8 @@
         </p:nvSpPr>
         <p:spPr>
           <a:xfrm>
-            <a:off x="457200" y="457200"/>
-            <a:ext cx="8229600" cy="731520"/>
+            <a:off x="457200" y="274320"/>
+            <a:ext cx="8229600" cy="640080"/>
           </a:xfrm>
           <a:prstGeom prst="rect">
             <a:avLst/>
@@ -4312,7 +4312,7 @@
           <a:lstStyle/>
           <a:p>
             <a:pPr>
-              <a:defRPr sz="4000" b="1">
+              <a:defRPr sz="3600" b="1">
                 <a:solidFill>
                   <a:srgbClr val="2E5C8A"/>
                 </a:solidFill>
@@ -4332,8 +4332,8 @@
         </p:nvSpPr>
         <p:spPr>
           <a:xfrm>
-            <a:off x="1097280" y="1828800"/>
-            <a:ext cx="457200" cy="457200"/>
+            <a:off x="457200" y="1097280"/>
+            <a:ext cx="365760" cy="365760"/>
           </a:xfrm>
           <a:prstGeom prst="rect">
             <a:avLst/>
@@ -4372,8 +4372,8 @@
         </p:nvSpPr>
         <p:spPr>
           <a:xfrm>
-            <a:off x="1097280" y="1828800"/>
-            <a:ext cx="457200" cy="457200"/>
+            <a:off x="457200" y="1097280"/>
+            <a:ext cx="365760" cy="365760"/>
           </a:xfrm>
           <a:prstGeom prst="rect">
             <a:avLst/>
@@ -4387,7 +4387,7 @@
           <a:lstStyle/>
           <a:p>
             <a:pPr algn="ctr">
-              <a:defRPr sz="2400" b="1">
+              <a:defRPr sz="1600" b="1">
                 <a:solidFill>
                   <a:srgbClr val="FFFFFF"/>
                 </a:solidFill>
@@ -4407,8 +4407,8 @@
         </p:nvSpPr>
         <p:spPr>
           <a:xfrm>
-            <a:off x="1828800" y="1828800"/>
-            <a:ext cx="5943600" cy="731520"/>
+            <a:off x="1005840" y="1097280"/>
+            <a:ext cx="7589520" cy="365760"/>
           </a:xfrm>
           <a:prstGeom prst="rect">
             <a:avLst/>
@@ -4422,28 +4422,63 @@
           <a:lstStyle/>
           <a:p>
             <a:pPr>
-              <a:defRPr sz="1800">
+              <a:defRPr sz="1400" b="1">
+                <a:solidFill>
+                  <a:srgbClr val="2E5C8A"/>
+                </a:solidFill>
+              </a:defRPr>
+            </a:pPr>
+            <a:r>
+              <a:t>{{REC_1_TITLE}}</a:t>
+            </a:r>
+          </a:p>
+        </p:txBody>
+      </p:sp>
+      <p:sp>
+        <p:nvSpPr>
+          <p:cNvPr id="6" name="TextBox 5"/>
+          <p:cNvSpPr txBox="1"/>
+          <p:nvPr/>
+        </p:nvSpPr>
+        <p:spPr>
+          <a:xfrm>
+            <a:off x="1005840" y="1481328"/>
+            <a:ext cx="7589520" cy="457200"/>
+          </a:xfrm>
+          <a:prstGeom prst="rect">
+            <a:avLst/>
+          </a:prstGeom>
+          <a:noFill/>
+        </p:spPr>
+        <p:txBody>
+          <a:bodyPr wrap="square">
+            <a:spAutoFit/>
+          </a:bodyPr>
+          <a:lstStyle/>
+          <a:p>
+            <a:pPr>
+              <a:defRPr sz="1100">
                 <a:solidFill>
                   <a:srgbClr val="4A5568"/>
                 </a:solidFill>
               </a:defRPr>
             </a:pPr>
             <a:r>
-              <a:t>{{RECOMMENDATION_1}}</a:t>
-            </a:r>
-          </a:p>
-        </p:txBody>
-      </p:sp>
-      <p:sp>
-        <p:nvSpPr>
-          <p:cNvPr id="6" name="Rectangle 5"/>
+              <a:t>{{REC_1_RATIONALE}}</a:t>
+            </a:r>
+          </a:p>
+        </p:txBody>
+      </p:sp>
+      <p:sp>
+        <p:nvSpPr>
+          <p:cNvPr id="7" name="Rectangle 6"/>
           <p:cNvSpPr/>
           <p:nvPr/>
         </p:nvSpPr>
         <p:spPr>
           <a:xfrm>
-            <a:off x="1097280" y="3200400"/>
-            <a:ext cx="457200" cy="457200"/>
+            <a:off x="457200" y="2011680"/>
+            <a:ext cx="365760" cy="365760"/>
           </a:xfrm>
           <a:prstGeom prst="rect">
             <a:avLst/>
@@ -4476,14 +4511,14 @@
       </p:sp>
       <p:sp>
         <p:nvSpPr>
-          <p:cNvPr id="7" name="TextBox 6"/>
+          <p:cNvPr id="8" name="TextBox 7"/>
           <p:cNvSpPr txBox="1"/>
           <p:nvPr/>
         </p:nvSpPr>
         <p:spPr>
           <a:xfrm>
-            <a:off x="1097280" y="3200400"/>
-            <a:ext cx="457200" cy="457200"/>
+            <a:off x="457200" y="2011680"/>
+            <a:ext cx="365760" cy="365760"/>
           </a:xfrm>
           <a:prstGeom prst="rect">
             <a:avLst/>
@@ -4497,7 +4532,7 @@
           <a:lstStyle/>
           <a:p>
             <a:pPr algn="ctr">
-              <a:defRPr sz="2400" b="1">
+              <a:defRPr sz="1600" b="1">
                 <a:solidFill>
                   <a:srgbClr val="FFFFFF"/>
                 </a:solidFill>
@@ -4511,14 +4546,14 @@
       </p:sp>
       <p:sp>
         <p:nvSpPr>
-          <p:cNvPr id="8" name="TextBox 7"/>
+          <p:cNvPr id="9" name="TextBox 8"/>
           <p:cNvSpPr txBox="1"/>
           <p:nvPr/>
         </p:nvSpPr>
         <p:spPr>
           <a:xfrm>
-            <a:off x="1828800" y="3200400"/>
-            <a:ext cx="5943600" cy="731520"/>
+            <a:off x="1005840" y="2011680"/>
+            <a:ext cx="7589520" cy="365760"/>
           </a:xfrm>
           <a:prstGeom prst="rect">
             <a:avLst/>
@@ -4532,28 +4567,63 @@
           <a:lstStyle/>
           <a:p>
             <a:pPr>
-              <a:defRPr sz="1800">
+              <a:defRPr sz="1400" b="1">
+                <a:solidFill>
+                  <a:srgbClr val="2E5C8A"/>
+                </a:solidFill>
+              </a:defRPr>
+            </a:pPr>
+            <a:r>
+              <a:t>{{REC_2_TITLE}}</a:t>
+            </a:r>
+          </a:p>
+        </p:txBody>
+      </p:sp>
+      <p:sp>
+        <p:nvSpPr>
+          <p:cNvPr id="10" name="TextBox 9"/>
+          <p:cNvSpPr txBox="1"/>
+          <p:nvPr/>
+        </p:nvSpPr>
+        <p:spPr>
+          <a:xfrm>
+            <a:off x="1005840" y="2395728"/>
+            <a:ext cx="7589520" cy="457200"/>
+          </a:xfrm>
+          <a:prstGeom prst="rect">
+            <a:avLst/>
+          </a:prstGeom>
+          <a:noFill/>
+        </p:spPr>
+        <p:txBody>
+          <a:bodyPr wrap="square">
+            <a:spAutoFit/>
+          </a:bodyPr>
+          <a:lstStyle/>
+          <a:p>
+            <a:pPr>
+              <a:defRPr sz="1100">
                 <a:solidFill>
                   <a:srgbClr val="4A5568"/>
                 </a:solidFill>
               </a:defRPr>
             </a:pPr>
             <a:r>
-              <a:t>{{RECOMMENDATION_2}}</a:t>
-            </a:r>
-          </a:p>
-        </p:txBody>
-      </p:sp>
-      <p:sp>
-        <p:nvSpPr>
-          <p:cNvPr id="9" name="Rectangle 8"/>
+              <a:t>{{REC_2_RATIONALE}}</a:t>
+            </a:r>
+          </a:p>
+        </p:txBody>
+      </p:sp>
+      <p:sp>
+        <p:nvSpPr>
+          <p:cNvPr id="11" name="Rectangle 10"/>
           <p:cNvSpPr/>
           <p:nvPr/>
         </p:nvSpPr>
         <p:spPr>
           <a:xfrm>
-            <a:off x="1097280" y="4572000"/>
-            <a:ext cx="457200" cy="457200"/>
+            <a:off x="457200" y="2926080"/>
+            <a:ext cx="365760" cy="365760"/>
           </a:xfrm>
           <a:prstGeom prst="rect">
             <a:avLst/>
@@ -4586,14 +4656,14 @@
       </p:sp>
       <p:sp>
         <p:nvSpPr>
-          <p:cNvPr id="10" name="TextBox 9"/>
+          <p:cNvPr id="12" name="TextBox 11"/>
           <p:cNvSpPr txBox="1"/>
           <p:nvPr/>
         </p:nvSpPr>
         <p:spPr>
           <a:xfrm>
-            <a:off x="1097280" y="4572000"/>
-            <a:ext cx="457200" cy="457200"/>
+            <a:off x="457200" y="2926080"/>
+            <a:ext cx="365760" cy="365760"/>
           </a:xfrm>
           <a:prstGeom prst="rect">
             <a:avLst/>
@@ -4607,7 +4677,7 @@
           <a:lstStyle/>
           <a:p>
             <a:pPr algn="ctr">
-              <a:defRPr sz="2400" b="1">
+              <a:defRPr sz="1600" b="1">
                 <a:solidFill>
                   <a:srgbClr val="FFFFFF"/>
                 </a:solidFill>
@@ -4621,14 +4691,14 @@
       </p:sp>
       <p:sp>
         <p:nvSpPr>
-          <p:cNvPr id="11" name="TextBox 10"/>
+          <p:cNvPr id="13" name="TextBox 12"/>
           <p:cNvSpPr txBox="1"/>
           <p:nvPr/>
         </p:nvSpPr>
         <p:spPr>
           <a:xfrm>
-            <a:off x="1828800" y="4572000"/>
-            <a:ext cx="5943600" cy="731520"/>
+            <a:off x="1005840" y="2926080"/>
+            <a:ext cx="7589520" cy="365760"/>
           </a:xfrm>
           <a:prstGeom prst="rect">
             <a:avLst/>
@@ -4642,14 +4712,49 @@
           <a:lstStyle/>
           <a:p>
             <a:pPr>
-              <a:defRPr sz="1800">
+              <a:defRPr sz="1400" b="1">
+                <a:solidFill>
+                  <a:srgbClr val="2E5C8A"/>
+                </a:solidFill>
+              </a:defRPr>
+            </a:pPr>
+            <a:r>
+              <a:t>{{REC_3_TITLE}}</a:t>
+            </a:r>
+          </a:p>
+        </p:txBody>
+      </p:sp>
+      <p:sp>
+        <p:nvSpPr>
+          <p:cNvPr id="14" name="TextBox 13"/>
+          <p:cNvSpPr txBox="1"/>
+          <p:nvPr/>
+        </p:nvSpPr>
+        <p:spPr>
+          <a:xfrm>
+            <a:off x="1005840" y="3310128"/>
+            <a:ext cx="7589520" cy="457200"/>
+          </a:xfrm>
+          <a:prstGeom prst="rect">
+            <a:avLst/>
+          </a:prstGeom>
+          <a:noFill/>
+        </p:spPr>
+        <p:txBody>
+          <a:bodyPr wrap="square">
+            <a:spAutoFit/>
+          </a:bodyPr>
+          <a:lstStyle/>
+          <a:p>
+            <a:pPr>
+              <a:defRPr sz="1100">
                 <a:solidFill>
                   <a:srgbClr val="4A5568"/>
                 </a:solidFill>
               </a:defRPr>
             </a:pPr>
             <a:r>
-              <a:t>{{RECOMMENDATION_3}}</a:t>
+              <a:t>{{REC_3_RATIONALE}}</a:t>
             </a:r>
           </a:p>
         </p:txBody>

</xml_diff>

<commit_message>
Squash merge add-llm-recommendations into main
</commit_message>
<xml_diff>
--- a/Master_QBR_Template.pptx
+++ b/Master_QBR_Template.pptx
@@ -4297,8 +4297,8 @@
         </p:nvSpPr>
         <p:spPr>
           <a:xfrm>
-            <a:off x="457200" y="457200"/>
-            <a:ext cx="8229600" cy="731520"/>
+            <a:off x="457200" y="274320"/>
+            <a:ext cx="8229600" cy="640080"/>
           </a:xfrm>
           <a:prstGeom prst="rect">
             <a:avLst/>
@@ -4312,7 +4312,7 @@
           <a:lstStyle/>
           <a:p>
             <a:pPr>
-              <a:defRPr sz="4000" b="1">
+              <a:defRPr sz="3600" b="1">
                 <a:solidFill>
                   <a:srgbClr val="2E5C8A"/>
                 </a:solidFill>
@@ -4332,8 +4332,8 @@
         </p:nvSpPr>
         <p:spPr>
           <a:xfrm>
-            <a:off x="1097280" y="1828800"/>
-            <a:ext cx="457200" cy="457200"/>
+            <a:off x="457200" y="1097280"/>
+            <a:ext cx="365760" cy="365760"/>
           </a:xfrm>
           <a:prstGeom prst="rect">
             <a:avLst/>
@@ -4372,8 +4372,8 @@
         </p:nvSpPr>
         <p:spPr>
           <a:xfrm>
-            <a:off x="1097280" y="1828800"/>
-            <a:ext cx="457200" cy="457200"/>
+            <a:off x="457200" y="1097280"/>
+            <a:ext cx="365760" cy="365760"/>
           </a:xfrm>
           <a:prstGeom prst="rect">
             <a:avLst/>
@@ -4387,7 +4387,7 @@
           <a:lstStyle/>
           <a:p>
             <a:pPr algn="ctr">
-              <a:defRPr sz="2400" b="1">
+              <a:defRPr sz="1600" b="1">
                 <a:solidFill>
                   <a:srgbClr val="FFFFFF"/>
                 </a:solidFill>
@@ -4407,8 +4407,8 @@
         </p:nvSpPr>
         <p:spPr>
           <a:xfrm>
-            <a:off x="1828800" y="1828800"/>
-            <a:ext cx="5943600" cy="731520"/>
+            <a:off x="1005840" y="1097280"/>
+            <a:ext cx="7589520" cy="365760"/>
           </a:xfrm>
           <a:prstGeom prst="rect">
             <a:avLst/>
@@ -4422,28 +4422,63 @@
           <a:lstStyle/>
           <a:p>
             <a:pPr>
-              <a:defRPr sz="1800">
+              <a:defRPr sz="1400" b="1">
+                <a:solidFill>
+                  <a:srgbClr val="2E5C8A"/>
+                </a:solidFill>
+              </a:defRPr>
+            </a:pPr>
+            <a:r>
+              <a:t>{{REC_1_TITLE}}</a:t>
+            </a:r>
+          </a:p>
+        </p:txBody>
+      </p:sp>
+      <p:sp>
+        <p:nvSpPr>
+          <p:cNvPr id="6" name="TextBox 5"/>
+          <p:cNvSpPr txBox="1"/>
+          <p:nvPr/>
+        </p:nvSpPr>
+        <p:spPr>
+          <a:xfrm>
+            <a:off x="1005840" y="1481328"/>
+            <a:ext cx="7589520" cy="457200"/>
+          </a:xfrm>
+          <a:prstGeom prst="rect">
+            <a:avLst/>
+          </a:prstGeom>
+          <a:noFill/>
+        </p:spPr>
+        <p:txBody>
+          <a:bodyPr wrap="square">
+            <a:spAutoFit/>
+          </a:bodyPr>
+          <a:lstStyle/>
+          <a:p>
+            <a:pPr>
+              <a:defRPr sz="1100">
                 <a:solidFill>
                   <a:srgbClr val="4A5568"/>
                 </a:solidFill>
               </a:defRPr>
             </a:pPr>
             <a:r>
-              <a:t>{{RECOMMENDATION_1}}</a:t>
-            </a:r>
-          </a:p>
-        </p:txBody>
-      </p:sp>
-      <p:sp>
-        <p:nvSpPr>
-          <p:cNvPr id="6" name="Rectangle 5"/>
+              <a:t>{{REC_1_RATIONALE}}</a:t>
+            </a:r>
+          </a:p>
+        </p:txBody>
+      </p:sp>
+      <p:sp>
+        <p:nvSpPr>
+          <p:cNvPr id="7" name="Rectangle 6"/>
           <p:cNvSpPr/>
           <p:nvPr/>
         </p:nvSpPr>
         <p:spPr>
           <a:xfrm>
-            <a:off x="1097280" y="3200400"/>
-            <a:ext cx="457200" cy="457200"/>
+            <a:off x="457200" y="2011680"/>
+            <a:ext cx="365760" cy="365760"/>
           </a:xfrm>
           <a:prstGeom prst="rect">
             <a:avLst/>
@@ -4476,14 +4511,14 @@
       </p:sp>
       <p:sp>
         <p:nvSpPr>
-          <p:cNvPr id="7" name="TextBox 6"/>
+          <p:cNvPr id="8" name="TextBox 7"/>
           <p:cNvSpPr txBox="1"/>
           <p:nvPr/>
         </p:nvSpPr>
         <p:spPr>
           <a:xfrm>
-            <a:off x="1097280" y="3200400"/>
-            <a:ext cx="457200" cy="457200"/>
+            <a:off x="457200" y="2011680"/>
+            <a:ext cx="365760" cy="365760"/>
           </a:xfrm>
           <a:prstGeom prst="rect">
             <a:avLst/>
@@ -4497,7 +4532,7 @@
           <a:lstStyle/>
           <a:p>
             <a:pPr algn="ctr">
-              <a:defRPr sz="2400" b="1">
+              <a:defRPr sz="1600" b="1">
                 <a:solidFill>
                   <a:srgbClr val="FFFFFF"/>
                 </a:solidFill>
@@ -4511,14 +4546,14 @@
       </p:sp>
       <p:sp>
         <p:nvSpPr>
-          <p:cNvPr id="8" name="TextBox 7"/>
+          <p:cNvPr id="9" name="TextBox 8"/>
           <p:cNvSpPr txBox="1"/>
           <p:nvPr/>
         </p:nvSpPr>
         <p:spPr>
           <a:xfrm>
-            <a:off x="1828800" y="3200400"/>
-            <a:ext cx="5943600" cy="731520"/>
+            <a:off x="1005840" y="2011680"/>
+            <a:ext cx="7589520" cy="365760"/>
           </a:xfrm>
           <a:prstGeom prst="rect">
             <a:avLst/>
@@ -4532,28 +4567,63 @@
           <a:lstStyle/>
           <a:p>
             <a:pPr>
-              <a:defRPr sz="1800">
+              <a:defRPr sz="1400" b="1">
+                <a:solidFill>
+                  <a:srgbClr val="2E5C8A"/>
+                </a:solidFill>
+              </a:defRPr>
+            </a:pPr>
+            <a:r>
+              <a:t>{{REC_2_TITLE}}</a:t>
+            </a:r>
+          </a:p>
+        </p:txBody>
+      </p:sp>
+      <p:sp>
+        <p:nvSpPr>
+          <p:cNvPr id="10" name="TextBox 9"/>
+          <p:cNvSpPr txBox="1"/>
+          <p:nvPr/>
+        </p:nvSpPr>
+        <p:spPr>
+          <a:xfrm>
+            <a:off x="1005840" y="2395728"/>
+            <a:ext cx="7589520" cy="457200"/>
+          </a:xfrm>
+          <a:prstGeom prst="rect">
+            <a:avLst/>
+          </a:prstGeom>
+          <a:noFill/>
+        </p:spPr>
+        <p:txBody>
+          <a:bodyPr wrap="square">
+            <a:spAutoFit/>
+          </a:bodyPr>
+          <a:lstStyle/>
+          <a:p>
+            <a:pPr>
+              <a:defRPr sz="1100">
                 <a:solidFill>
                   <a:srgbClr val="4A5568"/>
                 </a:solidFill>
               </a:defRPr>
             </a:pPr>
             <a:r>
-              <a:t>{{RECOMMENDATION_2}}</a:t>
-            </a:r>
-          </a:p>
-        </p:txBody>
-      </p:sp>
-      <p:sp>
-        <p:nvSpPr>
-          <p:cNvPr id="9" name="Rectangle 8"/>
+              <a:t>{{REC_2_RATIONALE}}</a:t>
+            </a:r>
+          </a:p>
+        </p:txBody>
+      </p:sp>
+      <p:sp>
+        <p:nvSpPr>
+          <p:cNvPr id="11" name="Rectangle 10"/>
           <p:cNvSpPr/>
           <p:nvPr/>
         </p:nvSpPr>
         <p:spPr>
           <a:xfrm>
-            <a:off x="1097280" y="4572000"/>
-            <a:ext cx="457200" cy="457200"/>
+            <a:off x="457200" y="2926080"/>
+            <a:ext cx="365760" cy="365760"/>
           </a:xfrm>
           <a:prstGeom prst="rect">
             <a:avLst/>
@@ -4586,14 +4656,14 @@
       </p:sp>
       <p:sp>
         <p:nvSpPr>
-          <p:cNvPr id="10" name="TextBox 9"/>
+          <p:cNvPr id="12" name="TextBox 11"/>
           <p:cNvSpPr txBox="1"/>
           <p:nvPr/>
         </p:nvSpPr>
         <p:spPr>
           <a:xfrm>
-            <a:off x="1097280" y="4572000"/>
-            <a:ext cx="457200" cy="457200"/>
+            <a:off x="457200" y="2926080"/>
+            <a:ext cx="365760" cy="365760"/>
           </a:xfrm>
           <a:prstGeom prst="rect">
             <a:avLst/>
@@ -4607,7 +4677,7 @@
           <a:lstStyle/>
           <a:p>
             <a:pPr algn="ctr">
-              <a:defRPr sz="2400" b="1">
+              <a:defRPr sz="1600" b="1">
                 <a:solidFill>
                   <a:srgbClr val="FFFFFF"/>
                 </a:solidFill>
@@ -4621,14 +4691,14 @@
       </p:sp>
       <p:sp>
         <p:nvSpPr>
-          <p:cNvPr id="11" name="TextBox 10"/>
+          <p:cNvPr id="13" name="TextBox 12"/>
           <p:cNvSpPr txBox="1"/>
           <p:nvPr/>
         </p:nvSpPr>
         <p:spPr>
           <a:xfrm>
-            <a:off x="1828800" y="4572000"/>
-            <a:ext cx="5943600" cy="731520"/>
+            <a:off x="1005840" y="2926080"/>
+            <a:ext cx="7589520" cy="365760"/>
           </a:xfrm>
           <a:prstGeom prst="rect">
             <a:avLst/>
@@ -4642,14 +4712,49 @@
           <a:lstStyle/>
           <a:p>
             <a:pPr>
-              <a:defRPr sz="1800">
+              <a:defRPr sz="1400" b="1">
+                <a:solidFill>
+                  <a:srgbClr val="2E5C8A"/>
+                </a:solidFill>
+              </a:defRPr>
+            </a:pPr>
+            <a:r>
+              <a:t>{{REC_3_TITLE}}</a:t>
+            </a:r>
+          </a:p>
+        </p:txBody>
+      </p:sp>
+      <p:sp>
+        <p:nvSpPr>
+          <p:cNvPr id="14" name="TextBox 13"/>
+          <p:cNvSpPr txBox="1"/>
+          <p:nvPr/>
+        </p:nvSpPr>
+        <p:spPr>
+          <a:xfrm>
+            <a:off x="1005840" y="3310128"/>
+            <a:ext cx="7589520" cy="457200"/>
+          </a:xfrm>
+          <a:prstGeom prst="rect">
+            <a:avLst/>
+          </a:prstGeom>
+          <a:noFill/>
+        </p:spPr>
+        <p:txBody>
+          <a:bodyPr wrap="square">
+            <a:spAutoFit/>
+          </a:bodyPr>
+          <a:lstStyle/>
+          <a:p>
+            <a:pPr>
+              <a:defRPr sz="1100">
                 <a:solidFill>
                   <a:srgbClr val="4A5568"/>
                 </a:solidFill>
               </a:defRPr>
             </a:pPr>
             <a:r>
-              <a:t>{{RECOMMENDATION_3}}</a:t>
+              <a:t>{{REC_3_RATIONALE}}</a:t>
             </a:r>
           </a:p>
         </p:txBody>

</xml_diff>